<commit_message>
feat: rebuild templates with native PPTX elements (editable text, shapes)
</commit_message>
<xml_diff>
--- a/pptx_engine/templates/bull-bear/chart-full-light.pptx
+++ b/pptx_engine/templates/bull-bear/chart-full-light.pptx
@@ -3081,6 +3081,14 @@
 <file path=ppt/slides/slide1.xml><?xml version="1.0" encoding="utf-8"?>
 <p:sld xmlns:a="http://schemas.openxmlformats.org/drawingml/2006/main" xmlns:p="http://schemas.openxmlformats.org/presentationml/2006/main" xmlns:r="http://schemas.openxmlformats.org/officeDocument/2006/relationships">
   <p:cSld>
+    <p:bg>
+      <p:bgPr>
+        <a:solidFill>
+          <a:srgbClr val="212121"/>
+        </a:solidFill>
+        <a:effectLst/>
+      </p:bgPr>
+    </p:bg>
     <p:spTree>
       <p:nvGrpSpPr>
         <p:cNvPr id="1" name=""/>
@@ -3088,40 +3096,16 @@
         <p:nvPr/>
       </p:nvGrpSpPr>
       <p:grpSpPr/>
-      <p:pic>
-        <p:nvPicPr>
-          <p:cNvPr id="2" name="Picture 1" descr="slide_05.png"/>
-          <p:cNvPicPr>
-            <a:picLocks noChangeAspect="1"/>
-          </p:cNvPicPr>
+      <p:sp>
+        <p:nvSpPr>
+          <p:cNvPr id="2" name="TextBox 1"/>
+          <p:cNvSpPr txBox="1"/>
           <p:nvPr/>
-        </p:nvPicPr>
-        <p:blipFill>
-          <a:blip r:embed="rId2"/>
-          <a:stretch>
-            <a:fillRect/>
-          </a:stretch>
-        </p:blipFill>
+        </p:nvSpPr>
         <p:spPr>
           <a:xfrm>
-            <a:off x="0" y="0"/>
-            <a:ext cx="24384030" cy="13716000"/>
-          </a:xfrm>
-          <a:prstGeom prst="rect">
-            <a:avLst/>
-          </a:prstGeom>
-        </p:spPr>
-      </p:pic>
-      <p:sp>
-        <p:nvSpPr>
-          <p:cNvPr id="3" name="breadcrumb"/>
-          <p:cNvSpPr txBox="1"/>
-          <p:nvPr/>
-        </p:nvSpPr>
-        <p:spPr>
-          <a:xfrm>
-            <a:off x="320040" y="164592"/>
-            <a:ext cx="2743200" cy="292608"/>
+            <a:off x="1066830" y="1143000"/>
+            <a:ext cx="5333969" cy="559155"/>
           </a:xfrm>
           <a:prstGeom prst="rect">
             <a:avLst/>
@@ -3136,27 +3120,27 @@
           <a:p>
             <a:pPr algn="l"/>
             <a:r>
-              <a:rPr sz="1100" b="0">
+              <a:rPr sz="3600" b="0" i="0">
                 <a:solidFill>
                   <a:srgbClr val="212121"/>
                 </a:solidFill>
                 <a:latin typeface="Rajdhani"/>
               </a:rPr>
-              <a:t>{{breadcrumb}}</a:t>
-            </a:r>
-          </a:p>
-        </p:txBody>
-      </p:sp>
-      <p:sp>
-        <p:nvSpPr>
-          <p:cNvPr id="4" name="slide_title"/>
+              <a:t>process</a:t>
+            </a:r>
+          </a:p>
+        </p:txBody>
+      </p:sp>
+      <p:sp>
+        <p:nvSpPr>
+          <p:cNvPr id="3" name="TextBox 2"/>
           <p:cNvSpPr txBox="1"/>
           <p:nvPr/>
         </p:nvSpPr>
         <p:spPr>
           <a:xfrm>
-            <a:off x="1371600" y="457200"/>
-            <a:ext cx="9418320" cy="685800"/>
+            <a:off x="10020635" y="12902366"/>
+            <a:ext cx="4342759" cy="304586"/>
           </a:xfrm>
           <a:prstGeom prst="rect">
             <a:avLst/>
@@ -3171,35 +3155,74 @@
           <a:p>
             <a:pPr algn="ctr"/>
             <a:r>
-              <a:rPr sz="4000" b="1">
+              <a:rPr sz="2000" b="0" i="0">
+                <a:solidFill>
+                  <a:srgbClr val="000000"/>
+                </a:solidFill>
+                <a:latin typeface="Quicksand (TT)"/>
+              </a:rPr>
+              <a:t>For illustrative purposes only.</a:t>
+            </a:r>
+          </a:p>
+        </p:txBody>
+      </p:sp>
+      <p:sp>
+        <p:nvSpPr>
+          <p:cNvPr id="4" name="TextBox 3"/>
+          <p:cNvSpPr txBox="1"/>
+          <p:nvPr/>
+        </p:nvSpPr>
+        <p:spPr>
+          <a:xfrm>
+            <a:off x="3853921" y="1043970"/>
+            <a:ext cx="16676187" cy="1623060"/>
+          </a:xfrm>
+          <a:prstGeom prst="rect">
+            <a:avLst/>
+          </a:prstGeom>
+          <a:noFill/>
+        </p:spPr>
+        <p:txBody>
+          <a:bodyPr wrap="square">
+            <a:spAutoFit/>
+          </a:bodyPr>
+          <a:lstStyle/>
+          <a:p>
+            <a:pPr algn="ctr"/>
+            <a:r>
+              <a:rPr sz="6000" b="0" i="0">
                 <a:solidFill>
                   <a:srgbClr val="212121"/>
                 </a:solidFill>
                 <a:latin typeface="Rajdhani"/>
               </a:rPr>
-              <a:t>{{slide_title}}</a:t>
-            </a:r>
-          </a:p>
-        </p:txBody>
-      </p:sp>
-      <p:sp>
-        <p:nvSpPr>
-          <p:cNvPr id="5" name="chart_image"/>
+              <a:t>trend direction</a:t>
+            </a:r>
+          </a:p>
+        </p:txBody>
+      </p:sp>
+      <p:sp>
+        <p:nvSpPr>
+          <p:cNvPr id="5" name="Rounded Rectangle 4"/>
           <p:cNvSpPr/>
           <p:nvPr/>
         </p:nvSpPr>
         <p:spPr>
           <a:xfrm>
-            <a:off x="182880" y="1234440"/>
-            <a:ext cx="11795760" cy="5074920"/>
+            <a:off x="-82570" y="-82570"/>
+            <a:ext cx="24549171" cy="13881232"/>
           </a:xfrm>
-          <a:prstGeom prst="rect">
+          <a:prstGeom prst="roundRect">
             <a:avLst/>
           </a:prstGeom>
-          <a:noFill/>
-          <a:ln w="12700">
+          <a:solidFill>
+            <a:srgbClr val="212121">
+              <a:alpha val="5000"/>
+            </a:srgbClr>
+          </a:solidFill>
+          <a:ln w="50800">
             <a:solidFill>
-              <a:srgbClr val="FEC00F"/>
+              <a:srgbClr val="D6E0DE"/>
             </a:solidFill>
           </a:ln>
         </p:spPr>
@@ -3227,36 +3250,45 @@
       </p:sp>
       <p:sp>
         <p:nvSpPr>
-          <p:cNvPr id="6" name="disclaimer"/>
-          <p:cNvSpPr txBox="1"/>
+          <p:cNvPr id="6" name="image_placeholder"/>
+          <p:cNvSpPr/>
           <p:nvPr/>
         </p:nvSpPr>
         <p:spPr>
           <a:xfrm>
-            <a:off x="1371600" y="6355080"/>
-            <a:ext cx="9418320" cy="320040"/>
+            <a:off x="3134654" y="2293406"/>
+            <a:ext cx="18114721" cy="10275752"/>
           </a:xfrm>
           <a:prstGeom prst="rect">
             <a:avLst/>
           </a:prstGeom>
           <a:noFill/>
+          <a:ln w="6350">
+            <a:solidFill>
+              <a:srgbClr val="CCCCCC"/>
+            </a:solidFill>
+            <a:prstDash val="sysDash"/>
+          </a:ln>
         </p:spPr>
-        <p:txBody>
-          <a:bodyPr wrap="square">
-            <a:spAutoFit/>
-          </a:bodyPr>
+        <p:style>
+          <a:lnRef idx="1">
+            <a:schemeClr val="accent1"/>
+          </a:lnRef>
+          <a:fillRef idx="3">
+            <a:schemeClr val="accent1"/>
+          </a:fillRef>
+          <a:effectRef idx="2">
+            <a:schemeClr val="accent1"/>
+          </a:effectRef>
+          <a:fontRef idx="minor">
+            <a:schemeClr val="lt1"/>
+          </a:fontRef>
+        </p:style>
+        <p:txBody>
+          <a:bodyPr rtlCol="0" anchor="ctr"/>
           <a:lstStyle/>
           <a:p>
             <a:pPr algn="ctr"/>
-            <a:r>
-              <a:rPr sz="1000" b="0">
-                <a:solidFill>
-                  <a:srgbClr val="212121"/>
-                </a:solidFill>
-                <a:latin typeface="Quicksand"/>
-              </a:rPr>
-              <a:t>{{disclaimer}}</a:t>
-            </a:r>
           </a:p>
         </p:txBody>
       </p:sp>

</xml_diff>

<commit_message>
feat: v3 templates with native shapes, editable text, 32 element PNGs from InDesign
</commit_message>
<xml_diff>
--- a/pptx_engine/templates/bull-bear/chart-full-light.pptx
+++ b/pptx_engine/templates/bull-bear/chart-full-light.pptx
@@ -3248,12 +3248,20 @@
           </a:p>
         </p:txBody>
       </p:sp>
-      <p:sp>
-        <p:nvSpPr>
-          <p:cNvPr id="6" name="image_placeholder"/>
-          <p:cNvSpPr/>
+      <p:pic>
+        <p:nvPicPr>
+          <p:cNvPr id="6" name="Picture 5" descr="1 - SPX.png"/>
+          <p:cNvPicPr>
+            <a:picLocks noChangeAspect="1"/>
+          </p:cNvPicPr>
           <p:nvPr/>
-        </p:nvSpPr>
+        </p:nvPicPr>
+        <p:blipFill>
+          <a:blip r:embed="rId2"/>
+          <a:stretch>
+            <a:fillRect/>
+          </a:stretch>
+        </p:blipFill>
         <p:spPr>
           <a:xfrm>
             <a:off x="3134654" y="2293406"/>
@@ -3262,36 +3270,8 @@
           <a:prstGeom prst="rect">
             <a:avLst/>
           </a:prstGeom>
-          <a:noFill/>
-          <a:ln w="6350">
-            <a:solidFill>
-              <a:srgbClr val="CCCCCC"/>
-            </a:solidFill>
-            <a:prstDash val="sysDash"/>
-          </a:ln>
         </p:spPr>
-        <p:style>
-          <a:lnRef idx="1">
-            <a:schemeClr val="accent1"/>
-          </a:lnRef>
-          <a:fillRef idx="3">
-            <a:schemeClr val="accent1"/>
-          </a:fillRef>
-          <a:effectRef idx="2">
-            <a:schemeClr val="accent1"/>
-          </a:effectRef>
-          <a:fontRef idx="minor">
-            <a:schemeClr val="lt1"/>
-          </a:fontRef>
-        </p:style>
-        <p:txBody>
-          <a:bodyPr rtlCol="0" anchor="ctr"/>
-          <a:lstStyle/>
-          <a:p>
-            <a:pPr algn="ctr"/>
-          </a:p>
-        </p:txBody>
-      </p:sp>
+      </p:pic>
     </p:spTree>
   </p:cSld>
   <p:clrMapOvr>

</xml_diff>